<commit_message>
Updated graphic in poster
</commit_message>
<xml_diff>
--- a/poster.pptx
+++ b/poster.pptx
@@ -4370,16 +4370,102 @@
           </a:p>
         </p:txBody>
       </p:sp>
+      <p:sp>
+        <p:nvSpPr>
+          <p:cNvPr id="48" name="TextBox 47"/>
+          <p:cNvSpPr txBox="1"/>
+          <p:nvPr/>
+        </p:nvSpPr>
+        <p:spPr>
+          <a:xfrm>
+            <a:off x="22674998" y="18511705"/>
+            <a:ext cx="9202994" cy="2677656"/>
+          </a:xfrm>
+          <a:prstGeom prst="rect">
+            <a:avLst/>
+          </a:prstGeom>
+          <a:noFill/>
+        </p:spPr>
+        <p:txBody>
+          <a:bodyPr wrap="square" rtlCol="0">
+            <a:spAutoFit/>
+          </a:bodyPr>
+          <a:lstStyle/>
+          <a:p>
+            <a:pPr algn="just"/>
+            <a:r>
+              <a:rPr lang="en-US" sz="2800" dirty="0">
+                <a:latin typeface="Times New Roman" panose="02020603050405020304" pitchFamily="18" charset="0"/>
+                <a:cs typeface="Times New Roman" panose="02020603050405020304" pitchFamily="18" charset="0"/>
+              </a:rPr>
+              <a:t> </a:t>
+            </a:r>
+            <a:r>
+              <a:rPr lang="en-US" sz="2800" dirty="0" smtClean="0">
+                <a:latin typeface="Times New Roman" panose="02020603050405020304" pitchFamily="18" charset="0"/>
+                <a:cs typeface="Times New Roman" panose="02020603050405020304" pitchFamily="18" charset="0"/>
+              </a:rPr>
+              <a:t>   We measured events by </a:t>
+            </a:r>
+            <a:r>
+              <a:rPr lang="en-US" sz="2800" dirty="0" err="1" smtClean="0">
+                <a:latin typeface="Times New Roman" panose="02020603050405020304" pitchFamily="18" charset="0"/>
+                <a:cs typeface="Times New Roman" panose="02020603050405020304" pitchFamily="18" charset="0"/>
+              </a:rPr>
+              <a:t>binarizing</a:t>
+            </a:r>
+            <a:r>
+              <a:rPr lang="en-US" sz="2800" dirty="0" smtClean="0">
+                <a:latin typeface="Times New Roman" panose="02020603050405020304" pitchFamily="18" charset="0"/>
+                <a:cs typeface="Times New Roman" panose="02020603050405020304" pitchFamily="18" charset="0"/>
+              </a:rPr>
+              <a:t> these level functions using a threshold of 0.5. On the DCASE evaluation set, we achieved an </a:t>
+            </a:r>
+            <a:r>
+              <a:rPr lang="en-US" sz="2800" b="1" dirty="0" smtClean="0">
+                <a:latin typeface="Times New Roman" panose="02020603050405020304" pitchFamily="18" charset="0"/>
+                <a:cs typeface="Times New Roman" panose="02020603050405020304" pitchFamily="18" charset="0"/>
+              </a:rPr>
+              <a:t>average error rate of 2.14</a:t>
+            </a:r>
+            <a:r>
+              <a:rPr lang="en-US" sz="2800" dirty="0" smtClean="0">
+                <a:latin typeface="Times New Roman" panose="02020603050405020304" pitchFamily="18" charset="0"/>
+                <a:cs typeface="Times New Roman" panose="02020603050405020304" pitchFamily="18" charset="0"/>
+              </a:rPr>
+              <a:t>, worse than the provided baseline error rate but better than several systems submitted for the challenge. Additionally, we achieved an </a:t>
+            </a:r>
+            <a:r>
+              <a:rPr lang="en-US" sz="2800" b="1" dirty="0" smtClean="0">
+                <a:latin typeface="Times New Roman" panose="02020603050405020304" pitchFamily="18" charset="0"/>
+                <a:cs typeface="Times New Roman" panose="02020603050405020304" pitchFamily="18" charset="0"/>
+              </a:rPr>
+              <a:t>average accuracy of 19.5%</a:t>
+            </a:r>
+            <a:r>
+              <a:rPr lang="en-US" sz="2800" dirty="0">
+                <a:latin typeface="Times New Roman" panose="02020603050405020304" pitchFamily="18" charset="0"/>
+                <a:cs typeface="Times New Roman" panose="02020603050405020304" pitchFamily="18" charset="0"/>
+              </a:rPr>
+              <a:t>.</a:t>
+            </a:r>
+            <a:endParaRPr lang="en-US" sz="2800" b="1" dirty="0" smtClean="0">
+              <a:latin typeface="Times New Roman" panose="02020603050405020304" pitchFamily="18" charset="0"/>
+              <a:cs typeface="Times New Roman" panose="02020603050405020304" pitchFamily="18" charset="0"/>
+            </a:endParaRPr>
+          </a:p>
+        </p:txBody>
+      </p:sp>
       <p:pic>
         <p:nvPicPr>
-          <p:cNvPr id="45" name="Picture 44"/>
+          <p:cNvPr id="49" name="Picture 48"/>
           <p:cNvPicPr>
             <a:picLocks noChangeAspect="1"/>
           </p:cNvPicPr>
           <p:nvPr/>
         </p:nvPicPr>
         <p:blipFill>
-          <a:blip r:embed="rId4">
+          <a:blip r:embed="rId6">
             <a:extLst>
               <a:ext uri="{28A0092B-C50C-407E-A947-70E740481C1C}">
                 <a14:useLocalDpi xmlns:a14="http://schemas.microsoft.com/office/drawing/2010/main" val="0"/>
@@ -4392,8 +4478,8 @@
         </p:blipFill>
         <p:spPr>
           <a:xfrm>
-            <a:off x="22515239" y="13211375"/>
-            <a:ext cx="4680027" cy="4381909"/>
+            <a:off x="22558785" y="13211375"/>
+            <a:ext cx="4629798" cy="4381910"/>
           </a:xfrm>
           <a:prstGeom prst="rect">
             <a:avLst/>
@@ -4402,14 +4488,14 @@
       </p:pic>
       <p:pic>
         <p:nvPicPr>
-          <p:cNvPr id="46" name="Picture 45"/>
+          <p:cNvPr id="50" name="Picture 49"/>
           <p:cNvPicPr>
             <a:picLocks noChangeAspect="1"/>
           </p:cNvPicPr>
           <p:nvPr/>
         </p:nvPicPr>
         <p:blipFill>
-          <a:blip r:embed="rId5">
+          <a:blip r:embed="rId7">
             <a:extLst>
               <a:ext uri="{28A0092B-C50C-407E-A947-70E740481C1C}">
                 <a14:useLocalDpi xmlns:a14="http://schemas.microsoft.com/office/drawing/2010/main" val="0"/>
@@ -4422,7 +4508,7 @@
         </p:blipFill>
         <p:spPr>
           <a:xfrm>
-            <a:off x="27203287" y="13211374"/>
+            <a:off x="27204624" y="13211374"/>
             <a:ext cx="4714809" cy="4714809"/>
           </a:xfrm>
           <a:prstGeom prst="rect">
@@ -4493,78 +4579,6 @@
               </a:rPr>
               <a:t>Figure 4. Decomposition Results on Untrained “Clear Throat” + “Cough” + “Door Slam” Example</a:t>
             </a:r>
-          </a:p>
-        </p:txBody>
-      </p:sp>
-      <p:sp>
-        <p:nvSpPr>
-          <p:cNvPr id="48" name="TextBox 47"/>
-          <p:cNvSpPr txBox="1"/>
-          <p:nvPr/>
-        </p:nvSpPr>
-        <p:spPr>
-          <a:xfrm>
-            <a:off x="22674998" y="18511705"/>
-            <a:ext cx="9202994" cy="2677656"/>
-          </a:xfrm>
-          <a:prstGeom prst="rect">
-            <a:avLst/>
-          </a:prstGeom>
-          <a:noFill/>
-        </p:spPr>
-        <p:txBody>
-          <a:bodyPr wrap="square" rtlCol="0">
-            <a:spAutoFit/>
-          </a:bodyPr>
-          <a:lstStyle/>
-          <a:p>
-            <a:pPr algn="just"/>
-            <a:r>
-              <a:rPr lang="en-US" sz="2800" dirty="0">
-                <a:latin typeface="Times New Roman" panose="02020603050405020304" pitchFamily="18" charset="0"/>
-                <a:cs typeface="Times New Roman" panose="02020603050405020304" pitchFamily="18" charset="0"/>
-              </a:rPr>
-              <a:t> </a:t>
-            </a:r>
-            <a:r>
-              <a:rPr lang="en-US" sz="2800" dirty="0" smtClean="0">
-                <a:latin typeface="Times New Roman" panose="02020603050405020304" pitchFamily="18" charset="0"/>
-                <a:cs typeface="Times New Roman" panose="02020603050405020304" pitchFamily="18" charset="0"/>
-              </a:rPr>
-              <a:t>   On the DCASE evaluation set, we achieved an </a:t>
-            </a:r>
-            <a:r>
-              <a:rPr lang="en-US" sz="2800" b="1" dirty="0" smtClean="0">
-                <a:latin typeface="Times New Roman" panose="02020603050405020304" pitchFamily="18" charset="0"/>
-                <a:cs typeface="Times New Roman" panose="02020603050405020304" pitchFamily="18" charset="0"/>
-              </a:rPr>
-              <a:t>average error rate of 2.14</a:t>
-            </a:r>
-            <a:r>
-              <a:rPr lang="en-US" sz="2800" dirty="0" smtClean="0">
-                <a:latin typeface="Times New Roman" panose="02020603050405020304" pitchFamily="18" charset="0"/>
-                <a:cs typeface="Times New Roman" panose="02020603050405020304" pitchFamily="18" charset="0"/>
-              </a:rPr>
-              <a:t>, worse than the provided baseline error rate but better than several systems submitted for the challenge. Additionally, we achieved an </a:t>
-            </a:r>
-            <a:r>
-              <a:rPr lang="en-US" sz="2800" b="1" dirty="0" smtClean="0">
-                <a:latin typeface="Times New Roman" panose="02020603050405020304" pitchFamily="18" charset="0"/>
-                <a:cs typeface="Times New Roman" panose="02020603050405020304" pitchFamily="18" charset="0"/>
-              </a:rPr>
-              <a:t>average accuracy of 19.5%</a:t>
-            </a:r>
-            <a:r>
-              <a:rPr lang="en-US" sz="2800" dirty="0" smtClean="0">
-                <a:latin typeface="Times New Roman" panose="02020603050405020304" pitchFamily="18" charset="0"/>
-                <a:cs typeface="Times New Roman" panose="02020603050405020304" pitchFamily="18" charset="0"/>
-              </a:rPr>
-              <a:t>, the rate of correct detection and classification of events in the evaluation clips.</a:t>
-            </a:r>
-            <a:endParaRPr lang="en-US" sz="2800" b="1" dirty="0" smtClean="0">
-              <a:latin typeface="Times New Roman" panose="02020603050405020304" pitchFamily="18" charset="0"/>
-              <a:cs typeface="Times New Roman" panose="02020603050405020304" pitchFamily="18" charset="0"/>
-            </a:endParaRPr>
           </a:p>
         </p:txBody>
       </p:sp>

</xml_diff>